<commit_message>
minor fixes to director and html
</commit_message>
<xml_diff>
--- a/IMDB 5000 Movies.pptx
+++ b/IMDB 5000 Movies.pptx
@@ -287,7 +287,7 @@
           <a:p>
             <a:fld id="{027580CD-1FA1-4B64-BABA-A4C06EF23250}" type="datetimeFigureOut">
               <a:rPr lang="en-US" smtClean="0"/>
-              <a:t>12/8/2018</a:t>
+              <a:t>12/11/2018</a:t>
             </a:fld>
             <a:endParaRPr lang="en-US"/>
           </a:p>
@@ -599,7 +599,7 @@
           <a:p>
             <a:fld id="{027580CD-1FA1-4B64-BABA-A4C06EF23250}" type="datetimeFigureOut">
               <a:rPr lang="en-US" smtClean="0"/>
-              <a:t>12/8/2018</a:t>
+              <a:t>12/11/2018</a:t>
             </a:fld>
             <a:endParaRPr lang="en-US"/>
           </a:p>
@@ -821,7 +821,7 @@
           <a:p>
             <a:fld id="{027580CD-1FA1-4B64-BABA-A4C06EF23250}" type="datetimeFigureOut">
               <a:rPr lang="en-US" smtClean="0"/>
-              <a:t>12/8/2018</a:t>
+              <a:t>12/11/2018</a:t>
             </a:fld>
             <a:endParaRPr lang="en-US"/>
           </a:p>
@@ -1112,7 +1112,7 @@
           <a:p>
             <a:fld id="{027580CD-1FA1-4B64-BABA-A4C06EF23250}" type="datetimeFigureOut">
               <a:rPr lang="en-US" smtClean="0"/>
-              <a:t>12/8/2018</a:t>
+              <a:t>12/11/2018</a:t>
             </a:fld>
             <a:endParaRPr lang="en-US"/>
           </a:p>
@@ -1566,7 +1566,7 @@
           <a:p>
             <a:fld id="{027580CD-1FA1-4B64-BABA-A4C06EF23250}" type="datetimeFigureOut">
               <a:rPr lang="en-US" smtClean="0"/>
-              <a:t>12/8/2018</a:t>
+              <a:t>12/11/2018</a:t>
             </a:fld>
             <a:endParaRPr lang="en-US"/>
           </a:p>
@@ -2142,7 +2142,7 @@
           <a:p>
             <a:fld id="{027580CD-1FA1-4B64-BABA-A4C06EF23250}" type="datetimeFigureOut">
               <a:rPr lang="en-US" smtClean="0"/>
-              <a:t>12/8/2018</a:t>
+              <a:t>12/11/2018</a:t>
             </a:fld>
             <a:endParaRPr lang="en-US"/>
           </a:p>
@@ -2994,7 +2994,7 @@
           <a:p>
             <a:fld id="{027580CD-1FA1-4B64-BABA-A4C06EF23250}" type="datetimeFigureOut">
               <a:rPr lang="en-US" smtClean="0"/>
-              <a:t>12/8/2018</a:t>
+              <a:t>12/11/2018</a:t>
             </a:fld>
             <a:endParaRPr lang="en-US"/>
           </a:p>
@@ -3199,7 +3199,7 @@
           <a:p>
             <a:fld id="{027580CD-1FA1-4B64-BABA-A4C06EF23250}" type="datetimeFigureOut">
               <a:rPr lang="en-US" smtClean="0"/>
-              <a:t>12/8/2018</a:t>
+              <a:t>12/11/2018</a:t>
             </a:fld>
             <a:endParaRPr lang="en-US"/>
           </a:p>
@@ -3413,7 +3413,7 @@
           <a:p>
             <a:fld id="{027580CD-1FA1-4B64-BABA-A4C06EF23250}" type="datetimeFigureOut">
               <a:rPr lang="en-US" smtClean="0"/>
-              <a:t>12/8/2018</a:t>
+              <a:t>12/11/2018</a:t>
             </a:fld>
             <a:endParaRPr lang="en-US"/>
           </a:p>
@@ -3618,7 +3618,7 @@
           <a:p>
             <a:fld id="{027580CD-1FA1-4B64-BABA-A4C06EF23250}" type="datetimeFigureOut">
               <a:rPr lang="en-US" smtClean="0"/>
-              <a:t>12/8/2018</a:t>
+              <a:t>12/11/2018</a:t>
             </a:fld>
             <a:endParaRPr lang="en-US"/>
           </a:p>
@@ -3898,7 +3898,7 @@
           <a:p>
             <a:fld id="{027580CD-1FA1-4B64-BABA-A4C06EF23250}" type="datetimeFigureOut">
               <a:rPr lang="en-US" smtClean="0"/>
-              <a:t>12/8/2018</a:t>
+              <a:t>12/11/2018</a:t>
             </a:fld>
             <a:endParaRPr lang="en-US"/>
           </a:p>
@@ -4165,7 +4165,7 @@
           <a:p>
             <a:fld id="{027580CD-1FA1-4B64-BABA-A4C06EF23250}" type="datetimeFigureOut">
               <a:rPr lang="en-US" smtClean="0"/>
-              <a:t>12/8/2018</a:t>
+              <a:t>12/11/2018</a:t>
             </a:fld>
             <a:endParaRPr lang="en-US"/>
           </a:p>
@@ -4580,7 +4580,7 @@
           <a:p>
             <a:fld id="{027580CD-1FA1-4B64-BABA-A4C06EF23250}" type="datetimeFigureOut">
               <a:rPr lang="en-US" smtClean="0"/>
-              <a:t>12/8/2018</a:t>
+              <a:t>12/11/2018</a:t>
             </a:fld>
             <a:endParaRPr lang="en-US"/>
           </a:p>
@@ -4728,7 +4728,7 @@
           <a:p>
             <a:fld id="{027580CD-1FA1-4B64-BABA-A4C06EF23250}" type="datetimeFigureOut">
               <a:rPr lang="en-US" smtClean="0"/>
-              <a:t>12/8/2018</a:t>
+              <a:t>12/11/2018</a:t>
             </a:fld>
             <a:endParaRPr lang="en-US"/>
           </a:p>
@@ -4853,7 +4853,7 @@
           <a:p>
             <a:fld id="{027580CD-1FA1-4B64-BABA-A4C06EF23250}" type="datetimeFigureOut">
               <a:rPr lang="en-US" smtClean="0"/>
-              <a:t>12/8/2018</a:t>
+              <a:t>12/11/2018</a:t>
             </a:fld>
             <a:endParaRPr lang="en-US"/>
           </a:p>
@@ -5132,7 +5132,7 @@
           <a:p>
             <a:fld id="{027580CD-1FA1-4B64-BABA-A4C06EF23250}" type="datetimeFigureOut">
               <a:rPr lang="en-US" smtClean="0"/>
-              <a:t>12/8/2018</a:t>
+              <a:t>12/11/2018</a:t>
             </a:fld>
             <a:endParaRPr lang="en-US"/>
           </a:p>
@@ -5444,7 +5444,7 @@
           <a:p>
             <a:fld id="{027580CD-1FA1-4B64-BABA-A4C06EF23250}" type="datetimeFigureOut">
               <a:rPr lang="en-US" smtClean="0"/>
-              <a:t>12/8/2018</a:t>
+              <a:t>12/11/2018</a:t>
             </a:fld>
             <a:endParaRPr lang="en-US"/>
           </a:p>
@@ -5697,7 +5697,7 @@
           <a:p>
             <a:fld id="{027580CD-1FA1-4B64-BABA-A4C06EF23250}" type="datetimeFigureOut">
               <a:rPr lang="en-US" smtClean="0"/>
-              <a:t>12/8/2018</a:t>
+              <a:t>12/11/2018</a:t>
             </a:fld>
             <a:endParaRPr lang="en-US"/>
           </a:p>
@@ -6977,7 +6977,15 @@
           <a:p>
             <a:r>
               <a:rPr lang="en-US" sz="1800" dirty="0"/>
-              <a:t>JAVASCRIPT (JQUERY, LeafLEt.js, D3.js)</a:t>
+              <a:t>JAVASCRIPT (</a:t>
+            </a:r>
+            <a:r>
+              <a:rPr lang="en-US" sz="1800" b="1" dirty="0"/>
+              <a:t>JQUERY</a:t>
+            </a:r>
+            <a:r>
+              <a:rPr lang="en-US" sz="1800" dirty="0"/>
+              <a:t>, LeafLEt.js, D3.js)</a:t>
             </a:r>
           </a:p>
           <a:p>
@@ -7415,13 +7423,13 @@
           <a:p>
             <a:r>
               <a:rPr lang="en-US" sz="1600" dirty="0"/>
-              <a:t>REMOVE Nulls</a:t>
+              <a:t>Reduce Variables to ONLY WHAT WE NEED</a:t>
             </a:r>
           </a:p>
           <a:p>
             <a:r>
               <a:rPr lang="en-US" sz="1600" dirty="0"/>
-              <a:t>Reduce Variables to ONLY WHAT WE NEED</a:t>
+              <a:t>REMOVE Nulls (NAN)</a:t>
             </a:r>
           </a:p>
           <a:p>

</xml_diff>